<commit_message>
final version of project 1
</commit_message>
<xml_diff>
--- a/Brandon_Scoggins_Code/project_1/Project 1 - ERS.pptx
+++ b/Brandon_Scoggins_Code/project_1/Project 1 - ERS.pptx
@@ -5,16 +5,17 @@
     <p:sldMasterId id="2147483684" r:id="rId1"/>
   </p:sldMasterIdLst>
   <p:notesMasterIdLst>
-    <p:notesMasterId r:id="rId9"/>
+    <p:notesMasterId r:id="rId10"/>
   </p:notesMasterIdLst>
   <p:sldIdLst>
     <p:sldId id="272" r:id="rId2"/>
     <p:sldId id="273" r:id="rId3"/>
     <p:sldId id="277" r:id="rId4"/>
-    <p:sldId id="275" r:id="rId5"/>
-    <p:sldId id="278" r:id="rId6"/>
-    <p:sldId id="274" r:id="rId7"/>
-    <p:sldId id="276" r:id="rId8"/>
+    <p:sldId id="278" r:id="rId5"/>
+    <p:sldId id="280" r:id="rId6"/>
+    <p:sldId id="275" r:id="rId7"/>
+    <p:sldId id="279" r:id="rId8"/>
+    <p:sldId id="276" r:id="rId9"/>
   </p:sldIdLst>
   <p:sldSz cx="12192000" cy="6858000"/>
   <p:notesSz cx="6858000" cy="9144000"/>
@@ -203,7 +204,7 @@
           <a:p>
             <a:fld id="{71BD4573-58E7-4156-A133-2731F5F8D1A6}" type="datetimeFigureOut">
               <a:rPr lang="en-US" smtClean="0"/>
-              <a:t>7/18/2018</a:t>
+              <a:t>7/19/2018</a:t>
             </a:fld>
             <a:endParaRPr lang="en-US"/>
           </a:p>
@@ -868,7 +869,7 @@
           <a:p>
             <a:fld id="{021A1D30-C0A0-4124-A783-34D9F15FA0FE}" type="datetime1">
               <a:rPr lang="en-US" smtClean="0"/>
-              <a:t>7/18/2018</a:t>
+              <a:t>7/19/2018</a:t>
             </a:fld>
             <a:endParaRPr lang="en-US"/>
           </a:p>
@@ -1052,7 +1053,7 @@
           <a:p>
             <a:fld id="{8D2D5871-AB0F-4B3D-8861-97E78CB7B47E}" type="datetime1">
               <a:rPr lang="en-US" smtClean="0"/>
-              <a:t>7/18/2018</a:t>
+              <a:t>7/19/2018</a:t>
             </a:fld>
             <a:endParaRPr lang="en-US"/>
           </a:p>
@@ -1246,7 +1247,7 @@
           <a:p>
             <a:fld id="{14418406-4C3F-4F3E-80BD-A22568EA37EB}" type="datetime1">
               <a:rPr lang="en-US" smtClean="0"/>
-              <a:t>7/18/2018</a:t>
+              <a:t>7/19/2018</a:t>
             </a:fld>
             <a:endParaRPr lang="en-US"/>
           </a:p>
@@ -1430,7 +1431,7 @@
           <a:p>
             <a:fld id="{65F28077-7188-48C5-8679-2287FAC952E9}" type="datetime1">
               <a:rPr lang="en-US" smtClean="0"/>
-              <a:t>7/18/2018</a:t>
+              <a:t>7/19/2018</a:t>
             </a:fld>
             <a:endParaRPr lang="en-US"/>
           </a:p>
@@ -1677,7 +1678,7 @@
           <a:p>
             <a:fld id="{D2DCB740-6776-4EE9-99FD-96D592FA5A23}" type="datetime1">
               <a:rPr lang="en-US" smtClean="0"/>
-              <a:t>7/18/2018</a:t>
+              <a:t>7/19/2018</a:t>
             </a:fld>
             <a:endParaRPr lang="en-US"/>
           </a:p>
@@ -1960,7 +1961,7 @@
           <a:p>
             <a:fld id="{05F6BD99-6FFD-46C5-B5E2-43A34BDA2566}" type="datetime1">
               <a:rPr lang="en-US" smtClean="0"/>
-              <a:t>7/18/2018</a:t>
+              <a:t>7/19/2018</a:t>
             </a:fld>
             <a:endParaRPr lang="en-US"/>
           </a:p>
@@ -2357,7 +2358,7 @@
           <a:p>
             <a:fld id="{E022678E-214C-4CF8-97C7-95015FB02960}" type="datetime1">
               <a:rPr lang="en-US" smtClean="0"/>
-              <a:t>7/18/2018</a:t>
+              <a:t>7/19/2018</a:t>
             </a:fld>
             <a:endParaRPr lang="en-US"/>
           </a:p>
@@ -2526,7 +2527,7 @@
           <a:p>
             <a:fld id="{D55660E0-FA77-4473-A859-74127B089143}" type="datetime1">
               <a:rPr lang="en-US" smtClean="0"/>
-              <a:t>7/18/2018</a:t>
+              <a:t>7/19/2018</a:t>
             </a:fld>
             <a:endParaRPr lang="en-US"/>
           </a:p>
@@ -2636,7 +2637,7 @@
           <a:p>
             <a:fld id="{3188D7B8-9F07-4899-827D-5F3CFDDEB574}" type="datetime1">
               <a:rPr lang="en-US" smtClean="0"/>
-              <a:t>7/18/2018</a:t>
+              <a:t>7/19/2018</a:t>
             </a:fld>
             <a:endParaRPr lang="en-US"/>
           </a:p>
@@ -2916,7 +2917,7 @@
           <a:p>
             <a:fld id="{B5197C5C-1CD1-417D-A89C-14747F5222C7}" type="datetime1">
               <a:rPr lang="en-US" smtClean="0"/>
-              <a:t>7/18/2018</a:t>
+              <a:t>7/19/2018</a:t>
             </a:fld>
             <a:endParaRPr lang="en-US"/>
           </a:p>
@@ -3269,7 +3270,7 @@
           <a:p>
             <a:fld id="{1359EFBB-CFA1-4AA8-9123-F0B52DBD84FE}" type="datetime1">
               <a:rPr lang="en-US" smtClean="0"/>
-              <a:t>7/18/2018</a:t>
+              <a:t>7/19/2018</a:t>
             </a:fld>
             <a:endParaRPr lang="en-US"/>
           </a:p>
@@ -4303,7 +4304,7 @@
             <a:fld id="{61146459-E3C3-4969-9224-5ED50B492D17}" type="datetime1">
               <a:rPr lang="en-US" smtClean="0"/>
               <a:pPr/>
-              <a:t>7/18/2018</a:t>
+              <a:t>7/19/2018</a:t>
             </a:fld>
             <a:endParaRPr lang="en-US" dirty="0"/>
           </a:p>
@@ -4950,6 +4951,384 @@
       </p:transition>
     </mc:Fallback>
   </mc:AlternateContent>
+  <p:timing>
+    <p:tnLst>
+      <p:par>
+        <p:cTn id="1" dur="indefinite" restart="never" nodeType="tmRoot">
+          <p:childTnLst>
+            <p:seq concurrent="1" nextAc="seek">
+              <p:cTn id="2" dur="indefinite" nodeType="mainSeq">
+                <p:childTnLst>
+                  <p:par>
+                    <p:cTn id="3" fill="hold">
+                      <p:stCondLst>
+                        <p:cond delay="indefinite"/>
+                      </p:stCondLst>
+                      <p:childTnLst>
+                        <p:par>
+                          <p:cTn id="4" fill="hold">
+                            <p:stCondLst>
+                              <p:cond delay="0"/>
+                            </p:stCondLst>
+                            <p:childTnLst>
+                              <p:par>
+                                <p:cTn id="5" presetID="10" presetClass="entr" presetSubtype="0" fill="hold" nodeType="clickEffect">
+                                  <p:stCondLst>
+                                    <p:cond delay="0"/>
+                                  </p:stCondLst>
+                                  <p:childTnLst>
+                                    <p:set>
+                                      <p:cBhvr>
+                                        <p:cTn id="6" dur="1" fill="hold">
+                                          <p:stCondLst>
+                                            <p:cond delay="0"/>
+                                          </p:stCondLst>
+                                        </p:cTn>
+                                        <p:tgtEl>
+                                          <p:spTgt spid="2">
+                                            <p:txEl>
+                                              <p:pRg st="0" end="0"/>
+                                            </p:txEl>
+                                          </p:spTgt>
+                                        </p:tgtEl>
+                                        <p:attrNameLst>
+                                          <p:attrName>style.visibility</p:attrName>
+                                        </p:attrNameLst>
+                                      </p:cBhvr>
+                                      <p:to>
+                                        <p:strVal val="visible"/>
+                                      </p:to>
+                                    </p:set>
+                                    <p:animEffect transition="in" filter="fade">
+                                      <p:cBhvr>
+                                        <p:cTn id="7" dur="500"/>
+                                        <p:tgtEl>
+                                          <p:spTgt spid="2">
+                                            <p:txEl>
+                                              <p:pRg st="0" end="0"/>
+                                            </p:txEl>
+                                          </p:spTgt>
+                                        </p:tgtEl>
+                                      </p:cBhvr>
+                                    </p:animEffect>
+                                  </p:childTnLst>
+                                </p:cTn>
+                              </p:par>
+                            </p:childTnLst>
+                          </p:cTn>
+                        </p:par>
+                      </p:childTnLst>
+                    </p:cTn>
+                  </p:par>
+                  <p:par>
+                    <p:cTn id="8" fill="hold">
+                      <p:stCondLst>
+                        <p:cond delay="indefinite"/>
+                      </p:stCondLst>
+                      <p:childTnLst>
+                        <p:par>
+                          <p:cTn id="9" fill="hold">
+                            <p:stCondLst>
+                              <p:cond delay="0"/>
+                            </p:stCondLst>
+                            <p:childTnLst>
+                              <p:par>
+                                <p:cTn id="10" presetID="10" presetClass="entr" presetSubtype="0" fill="hold" nodeType="clickEffect">
+                                  <p:stCondLst>
+                                    <p:cond delay="0"/>
+                                  </p:stCondLst>
+                                  <p:childTnLst>
+                                    <p:set>
+                                      <p:cBhvr>
+                                        <p:cTn id="11" dur="1" fill="hold">
+                                          <p:stCondLst>
+                                            <p:cond delay="0"/>
+                                          </p:stCondLst>
+                                        </p:cTn>
+                                        <p:tgtEl>
+                                          <p:spTgt spid="2">
+                                            <p:txEl>
+                                              <p:pRg st="1" end="1"/>
+                                            </p:txEl>
+                                          </p:spTgt>
+                                        </p:tgtEl>
+                                        <p:attrNameLst>
+                                          <p:attrName>style.visibility</p:attrName>
+                                        </p:attrNameLst>
+                                      </p:cBhvr>
+                                      <p:to>
+                                        <p:strVal val="visible"/>
+                                      </p:to>
+                                    </p:set>
+                                    <p:animEffect transition="in" filter="fade">
+                                      <p:cBhvr>
+                                        <p:cTn id="12" dur="500"/>
+                                        <p:tgtEl>
+                                          <p:spTgt spid="2">
+                                            <p:txEl>
+                                              <p:pRg st="1" end="1"/>
+                                            </p:txEl>
+                                          </p:spTgt>
+                                        </p:tgtEl>
+                                      </p:cBhvr>
+                                    </p:animEffect>
+                                  </p:childTnLst>
+                                </p:cTn>
+                              </p:par>
+                              <p:par>
+                                <p:cTn id="13" presetID="10" presetClass="entr" presetSubtype="0" fill="hold" nodeType="withEffect">
+                                  <p:stCondLst>
+                                    <p:cond delay="0"/>
+                                  </p:stCondLst>
+                                  <p:childTnLst>
+                                    <p:set>
+                                      <p:cBhvr>
+                                        <p:cTn id="14" dur="1" fill="hold">
+                                          <p:stCondLst>
+                                            <p:cond delay="0"/>
+                                          </p:stCondLst>
+                                        </p:cTn>
+                                        <p:tgtEl>
+                                          <p:spTgt spid="2">
+                                            <p:txEl>
+                                              <p:pRg st="2" end="2"/>
+                                            </p:txEl>
+                                          </p:spTgt>
+                                        </p:tgtEl>
+                                        <p:attrNameLst>
+                                          <p:attrName>style.visibility</p:attrName>
+                                        </p:attrNameLst>
+                                      </p:cBhvr>
+                                      <p:to>
+                                        <p:strVal val="visible"/>
+                                      </p:to>
+                                    </p:set>
+                                    <p:animEffect transition="in" filter="fade">
+                                      <p:cBhvr>
+                                        <p:cTn id="15" dur="500"/>
+                                        <p:tgtEl>
+                                          <p:spTgt spid="2">
+                                            <p:txEl>
+                                              <p:pRg st="2" end="2"/>
+                                            </p:txEl>
+                                          </p:spTgt>
+                                        </p:tgtEl>
+                                      </p:cBhvr>
+                                    </p:animEffect>
+                                  </p:childTnLst>
+                                </p:cTn>
+                              </p:par>
+                            </p:childTnLst>
+                          </p:cTn>
+                        </p:par>
+                      </p:childTnLst>
+                    </p:cTn>
+                  </p:par>
+                  <p:par>
+                    <p:cTn id="16" fill="hold">
+                      <p:stCondLst>
+                        <p:cond delay="indefinite"/>
+                      </p:stCondLst>
+                      <p:childTnLst>
+                        <p:par>
+                          <p:cTn id="17" fill="hold">
+                            <p:stCondLst>
+                              <p:cond delay="0"/>
+                            </p:stCondLst>
+                            <p:childTnLst>
+                              <p:par>
+                                <p:cTn id="18" presetID="10" presetClass="entr" presetSubtype="0" fill="hold" nodeType="clickEffect">
+                                  <p:stCondLst>
+                                    <p:cond delay="0"/>
+                                  </p:stCondLst>
+                                  <p:childTnLst>
+                                    <p:set>
+                                      <p:cBhvr>
+                                        <p:cTn id="19" dur="1" fill="hold">
+                                          <p:stCondLst>
+                                            <p:cond delay="0"/>
+                                          </p:stCondLst>
+                                        </p:cTn>
+                                        <p:tgtEl>
+                                          <p:spTgt spid="2">
+                                            <p:txEl>
+                                              <p:pRg st="3" end="3"/>
+                                            </p:txEl>
+                                          </p:spTgt>
+                                        </p:tgtEl>
+                                        <p:attrNameLst>
+                                          <p:attrName>style.visibility</p:attrName>
+                                        </p:attrNameLst>
+                                      </p:cBhvr>
+                                      <p:to>
+                                        <p:strVal val="visible"/>
+                                      </p:to>
+                                    </p:set>
+                                    <p:animEffect transition="in" filter="fade">
+                                      <p:cBhvr>
+                                        <p:cTn id="20" dur="500"/>
+                                        <p:tgtEl>
+                                          <p:spTgt spid="2">
+                                            <p:txEl>
+                                              <p:pRg st="3" end="3"/>
+                                            </p:txEl>
+                                          </p:spTgt>
+                                        </p:tgtEl>
+                                      </p:cBhvr>
+                                    </p:animEffect>
+                                  </p:childTnLst>
+                                </p:cTn>
+                              </p:par>
+                            </p:childTnLst>
+                          </p:cTn>
+                        </p:par>
+                      </p:childTnLst>
+                    </p:cTn>
+                  </p:par>
+                  <p:par>
+                    <p:cTn id="21" fill="hold">
+                      <p:stCondLst>
+                        <p:cond delay="indefinite"/>
+                      </p:stCondLst>
+                      <p:childTnLst>
+                        <p:par>
+                          <p:cTn id="22" fill="hold">
+                            <p:stCondLst>
+                              <p:cond delay="0"/>
+                            </p:stCondLst>
+                            <p:childTnLst>
+                              <p:par>
+                                <p:cTn id="23" presetID="10" presetClass="entr" presetSubtype="0" fill="hold" nodeType="clickEffect">
+                                  <p:stCondLst>
+                                    <p:cond delay="0"/>
+                                  </p:stCondLst>
+                                  <p:childTnLst>
+                                    <p:set>
+                                      <p:cBhvr>
+                                        <p:cTn id="24" dur="1" fill="hold">
+                                          <p:stCondLst>
+                                            <p:cond delay="0"/>
+                                          </p:stCondLst>
+                                        </p:cTn>
+                                        <p:tgtEl>
+                                          <p:spTgt spid="2">
+                                            <p:txEl>
+                                              <p:pRg st="4" end="4"/>
+                                            </p:txEl>
+                                          </p:spTgt>
+                                        </p:tgtEl>
+                                        <p:attrNameLst>
+                                          <p:attrName>style.visibility</p:attrName>
+                                        </p:attrNameLst>
+                                      </p:cBhvr>
+                                      <p:to>
+                                        <p:strVal val="visible"/>
+                                      </p:to>
+                                    </p:set>
+                                    <p:animEffect transition="in" filter="fade">
+                                      <p:cBhvr>
+                                        <p:cTn id="25" dur="500"/>
+                                        <p:tgtEl>
+                                          <p:spTgt spid="2">
+                                            <p:txEl>
+                                              <p:pRg st="4" end="4"/>
+                                            </p:txEl>
+                                          </p:spTgt>
+                                        </p:tgtEl>
+                                      </p:cBhvr>
+                                    </p:animEffect>
+                                  </p:childTnLst>
+                                </p:cTn>
+                              </p:par>
+                            </p:childTnLst>
+                          </p:cTn>
+                        </p:par>
+                      </p:childTnLst>
+                    </p:cTn>
+                  </p:par>
+                  <p:par>
+                    <p:cTn id="26" fill="hold">
+                      <p:stCondLst>
+                        <p:cond delay="indefinite"/>
+                      </p:stCondLst>
+                      <p:childTnLst>
+                        <p:par>
+                          <p:cTn id="27" fill="hold">
+                            <p:stCondLst>
+                              <p:cond delay="0"/>
+                            </p:stCondLst>
+                            <p:childTnLst>
+                              <p:par>
+                                <p:cTn id="28" presetID="10" presetClass="entr" presetSubtype="0" fill="hold" nodeType="clickEffect">
+                                  <p:stCondLst>
+                                    <p:cond delay="0"/>
+                                  </p:stCondLst>
+                                  <p:childTnLst>
+                                    <p:set>
+                                      <p:cBhvr>
+                                        <p:cTn id="29" dur="1" fill="hold">
+                                          <p:stCondLst>
+                                            <p:cond delay="0"/>
+                                          </p:stCondLst>
+                                        </p:cTn>
+                                        <p:tgtEl>
+                                          <p:spTgt spid="2">
+                                            <p:txEl>
+                                              <p:pRg st="5" end="5"/>
+                                            </p:txEl>
+                                          </p:spTgt>
+                                        </p:tgtEl>
+                                        <p:attrNameLst>
+                                          <p:attrName>style.visibility</p:attrName>
+                                        </p:attrNameLst>
+                                      </p:cBhvr>
+                                      <p:to>
+                                        <p:strVal val="visible"/>
+                                      </p:to>
+                                    </p:set>
+                                    <p:animEffect transition="in" filter="fade">
+                                      <p:cBhvr>
+                                        <p:cTn id="30" dur="500"/>
+                                        <p:tgtEl>
+                                          <p:spTgt spid="2">
+                                            <p:txEl>
+                                              <p:pRg st="5" end="5"/>
+                                            </p:txEl>
+                                          </p:spTgt>
+                                        </p:tgtEl>
+                                      </p:cBhvr>
+                                    </p:animEffect>
+                                  </p:childTnLst>
+                                </p:cTn>
+                              </p:par>
+                            </p:childTnLst>
+                          </p:cTn>
+                        </p:par>
+                      </p:childTnLst>
+                    </p:cTn>
+                  </p:par>
+                </p:childTnLst>
+              </p:cTn>
+              <p:prevCondLst>
+                <p:cond evt="onPrev" delay="0">
+                  <p:tgtEl>
+                    <p:sldTgt/>
+                  </p:tgtEl>
+                </p:cond>
+              </p:prevCondLst>
+              <p:nextCondLst>
+                <p:cond evt="onNext" delay="0">
+                  <p:tgtEl>
+                    <p:sldTgt/>
+                  </p:tgtEl>
+                </p:cond>
+              </p:nextCondLst>
+            </p:seq>
+          </p:childTnLst>
+        </p:cTn>
+      </p:par>
+    </p:tnLst>
+  </p:timing>
 </p:sld>
 </file>
 
@@ -5027,6 +5406,13 @@
             </a:r>
           </a:p>
           <a:p>
+            <a:pPr lvl="2"/>
+            <a:r>
+              <a:rPr lang="en-US" dirty="0"/>
+              <a:t>Sort by resolved or unresolved</a:t>
+            </a:r>
+          </a:p>
+          <a:p>
             <a:r>
               <a:rPr lang="en-US" dirty="0"/>
               <a:t>Manager</a:t>
@@ -5040,6 +5426,13 @@
             </a:r>
           </a:p>
           <a:p>
+            <a:pPr lvl="2"/>
+            <a:r>
+              <a:rPr lang="en-US" dirty="0"/>
+              <a:t>Sort by resolved or unresolved </a:t>
+            </a:r>
+          </a:p>
+          <a:p>
             <a:pPr lvl="1"/>
             <a:r>
               <a:rPr lang="en-US" dirty="0"/>
@@ -5047,7 +5440,7 @@
             </a:r>
           </a:p>
           <a:p>
-            <a:pPr lvl="1"/>
+            <a:pPr lvl="2"/>
             <a:r>
               <a:rPr lang="en-US" dirty="0"/>
               <a:t>Sort cases by type and status</a:t>
@@ -5080,140 +5473,370 @@
       </p:transition>
     </mc:Fallback>
   </mc:AlternateContent>
+  <p:timing>
+    <p:tnLst>
+      <p:par>
+        <p:cTn id="1" dur="indefinite" restart="never" nodeType="tmRoot">
+          <p:childTnLst>
+            <p:seq concurrent="1" nextAc="seek">
+              <p:cTn id="2" dur="indefinite" nodeType="mainSeq">
+                <p:childTnLst>
+                  <p:par>
+                    <p:cTn id="3" fill="hold">
+                      <p:stCondLst>
+                        <p:cond delay="indefinite"/>
+                      </p:stCondLst>
+                      <p:childTnLst>
+                        <p:par>
+                          <p:cTn id="4" fill="hold">
+                            <p:stCondLst>
+                              <p:cond delay="0"/>
+                            </p:stCondLst>
+                            <p:childTnLst>
+                              <p:par>
+                                <p:cTn id="5" presetID="10" presetClass="entr" presetSubtype="0" fill="hold" nodeType="clickEffect">
+                                  <p:stCondLst>
+                                    <p:cond delay="0"/>
+                                  </p:stCondLst>
+                                  <p:childTnLst>
+                                    <p:set>
+                                      <p:cBhvr>
+                                        <p:cTn id="6" dur="1" fill="hold">
+                                          <p:stCondLst>
+                                            <p:cond delay="0"/>
+                                          </p:stCondLst>
+                                        </p:cTn>
+                                        <p:tgtEl>
+                                          <p:spTgt spid="2">
+                                            <p:txEl>
+                                              <p:pRg st="1" end="1"/>
+                                            </p:txEl>
+                                          </p:spTgt>
+                                        </p:tgtEl>
+                                        <p:attrNameLst>
+                                          <p:attrName>style.visibility</p:attrName>
+                                        </p:attrNameLst>
+                                      </p:cBhvr>
+                                      <p:to>
+                                        <p:strVal val="visible"/>
+                                      </p:to>
+                                    </p:set>
+                                    <p:animEffect transition="in" filter="fade">
+                                      <p:cBhvr>
+                                        <p:cTn id="7" dur="500"/>
+                                        <p:tgtEl>
+                                          <p:spTgt spid="2">
+                                            <p:txEl>
+                                              <p:pRg st="1" end="1"/>
+                                            </p:txEl>
+                                          </p:spTgt>
+                                        </p:tgtEl>
+                                      </p:cBhvr>
+                                    </p:animEffect>
+                                  </p:childTnLst>
+                                </p:cTn>
+                              </p:par>
+                              <p:par>
+                                <p:cTn id="8" presetID="10" presetClass="entr" presetSubtype="0" fill="hold" nodeType="withEffect">
+                                  <p:stCondLst>
+                                    <p:cond delay="0"/>
+                                  </p:stCondLst>
+                                  <p:childTnLst>
+                                    <p:set>
+                                      <p:cBhvr>
+                                        <p:cTn id="9" dur="1" fill="hold">
+                                          <p:stCondLst>
+                                            <p:cond delay="0"/>
+                                          </p:stCondLst>
+                                        </p:cTn>
+                                        <p:tgtEl>
+                                          <p:spTgt spid="2">
+                                            <p:txEl>
+                                              <p:pRg st="4" end="4"/>
+                                            </p:txEl>
+                                          </p:spTgt>
+                                        </p:tgtEl>
+                                        <p:attrNameLst>
+                                          <p:attrName>style.visibility</p:attrName>
+                                        </p:attrNameLst>
+                                      </p:cBhvr>
+                                      <p:to>
+                                        <p:strVal val="visible"/>
+                                      </p:to>
+                                    </p:set>
+                                    <p:animEffect transition="in" filter="fade">
+                                      <p:cBhvr>
+                                        <p:cTn id="10" dur="500"/>
+                                        <p:tgtEl>
+                                          <p:spTgt spid="2">
+                                            <p:txEl>
+                                              <p:pRg st="4" end="4"/>
+                                            </p:txEl>
+                                          </p:spTgt>
+                                        </p:tgtEl>
+                                      </p:cBhvr>
+                                    </p:animEffect>
+                                  </p:childTnLst>
+                                </p:cTn>
+                              </p:par>
+                            </p:childTnLst>
+                          </p:cTn>
+                        </p:par>
+                      </p:childTnLst>
+                    </p:cTn>
+                  </p:par>
+                  <p:par>
+                    <p:cTn id="11" fill="hold">
+                      <p:stCondLst>
+                        <p:cond delay="indefinite"/>
+                      </p:stCondLst>
+                      <p:childTnLst>
+                        <p:par>
+                          <p:cTn id="12" fill="hold">
+                            <p:stCondLst>
+                              <p:cond delay="0"/>
+                            </p:stCondLst>
+                            <p:childTnLst>
+                              <p:par>
+                                <p:cTn id="13" presetID="10" presetClass="entr" presetSubtype="0" fill="hold" nodeType="clickEffect">
+                                  <p:stCondLst>
+                                    <p:cond delay="0"/>
+                                  </p:stCondLst>
+                                  <p:childTnLst>
+                                    <p:set>
+                                      <p:cBhvr>
+                                        <p:cTn id="14" dur="1" fill="hold">
+                                          <p:stCondLst>
+                                            <p:cond delay="0"/>
+                                          </p:stCondLst>
+                                        </p:cTn>
+                                        <p:tgtEl>
+                                          <p:spTgt spid="2">
+                                            <p:txEl>
+                                              <p:pRg st="2" end="2"/>
+                                            </p:txEl>
+                                          </p:spTgt>
+                                        </p:tgtEl>
+                                        <p:attrNameLst>
+                                          <p:attrName>style.visibility</p:attrName>
+                                        </p:attrNameLst>
+                                      </p:cBhvr>
+                                      <p:to>
+                                        <p:strVal val="visible"/>
+                                      </p:to>
+                                    </p:set>
+                                    <p:animEffect transition="in" filter="fade">
+                                      <p:cBhvr>
+                                        <p:cTn id="15" dur="500"/>
+                                        <p:tgtEl>
+                                          <p:spTgt spid="2">
+                                            <p:txEl>
+                                              <p:pRg st="2" end="2"/>
+                                            </p:txEl>
+                                          </p:spTgt>
+                                        </p:tgtEl>
+                                      </p:cBhvr>
+                                    </p:animEffect>
+                                  </p:childTnLst>
+                                </p:cTn>
+                              </p:par>
+                              <p:par>
+                                <p:cTn id="16" presetID="10" presetClass="entr" presetSubtype="0" fill="hold" nodeType="withEffect">
+                                  <p:stCondLst>
+                                    <p:cond delay="0"/>
+                                  </p:stCondLst>
+                                  <p:childTnLst>
+                                    <p:set>
+                                      <p:cBhvr>
+                                        <p:cTn id="17" dur="1" fill="hold">
+                                          <p:stCondLst>
+                                            <p:cond delay="0"/>
+                                          </p:stCondLst>
+                                        </p:cTn>
+                                        <p:tgtEl>
+                                          <p:spTgt spid="2">
+                                            <p:txEl>
+                                              <p:pRg st="5" end="5"/>
+                                            </p:txEl>
+                                          </p:spTgt>
+                                        </p:tgtEl>
+                                        <p:attrNameLst>
+                                          <p:attrName>style.visibility</p:attrName>
+                                        </p:attrNameLst>
+                                      </p:cBhvr>
+                                      <p:to>
+                                        <p:strVal val="visible"/>
+                                      </p:to>
+                                    </p:set>
+                                    <p:animEffect transition="in" filter="fade">
+                                      <p:cBhvr>
+                                        <p:cTn id="18" dur="500"/>
+                                        <p:tgtEl>
+                                          <p:spTgt spid="2">
+                                            <p:txEl>
+                                              <p:pRg st="5" end="5"/>
+                                            </p:txEl>
+                                          </p:spTgt>
+                                        </p:tgtEl>
+                                      </p:cBhvr>
+                                    </p:animEffect>
+                                  </p:childTnLst>
+                                </p:cTn>
+                              </p:par>
+                            </p:childTnLst>
+                          </p:cTn>
+                        </p:par>
+                      </p:childTnLst>
+                    </p:cTn>
+                  </p:par>
+                  <p:par>
+                    <p:cTn id="19" fill="hold">
+                      <p:stCondLst>
+                        <p:cond delay="indefinite"/>
+                      </p:stCondLst>
+                      <p:childTnLst>
+                        <p:par>
+                          <p:cTn id="20" fill="hold">
+                            <p:stCondLst>
+                              <p:cond delay="0"/>
+                            </p:stCondLst>
+                            <p:childTnLst>
+                              <p:par>
+                                <p:cTn id="21" presetID="10" presetClass="entr" presetSubtype="0" fill="hold" nodeType="clickEffect">
+                                  <p:stCondLst>
+                                    <p:cond delay="0"/>
+                                  </p:stCondLst>
+                                  <p:childTnLst>
+                                    <p:set>
+                                      <p:cBhvr>
+                                        <p:cTn id="22" dur="1" fill="hold">
+                                          <p:stCondLst>
+                                            <p:cond delay="0"/>
+                                          </p:stCondLst>
+                                        </p:cTn>
+                                        <p:tgtEl>
+                                          <p:spTgt spid="2">
+                                            <p:txEl>
+                                              <p:pRg st="6" end="6"/>
+                                            </p:txEl>
+                                          </p:spTgt>
+                                        </p:tgtEl>
+                                        <p:attrNameLst>
+                                          <p:attrName>style.visibility</p:attrName>
+                                        </p:attrNameLst>
+                                      </p:cBhvr>
+                                      <p:to>
+                                        <p:strVal val="visible"/>
+                                      </p:to>
+                                    </p:set>
+                                    <p:animEffect transition="in" filter="fade">
+                                      <p:cBhvr>
+                                        <p:cTn id="23" dur="500"/>
+                                        <p:tgtEl>
+                                          <p:spTgt spid="2">
+                                            <p:txEl>
+                                              <p:pRg st="6" end="6"/>
+                                            </p:txEl>
+                                          </p:spTgt>
+                                        </p:tgtEl>
+                                      </p:cBhvr>
+                                    </p:animEffect>
+                                  </p:childTnLst>
+                                </p:cTn>
+                              </p:par>
+                            </p:childTnLst>
+                          </p:cTn>
+                        </p:par>
+                      </p:childTnLst>
+                    </p:cTn>
+                  </p:par>
+                  <p:par>
+                    <p:cTn id="24" fill="hold">
+                      <p:stCondLst>
+                        <p:cond delay="indefinite"/>
+                      </p:stCondLst>
+                      <p:childTnLst>
+                        <p:par>
+                          <p:cTn id="25" fill="hold">
+                            <p:stCondLst>
+                              <p:cond delay="0"/>
+                            </p:stCondLst>
+                            <p:childTnLst>
+                              <p:par>
+                                <p:cTn id="26" presetID="10" presetClass="entr" presetSubtype="0" fill="hold" nodeType="clickEffect">
+                                  <p:stCondLst>
+                                    <p:cond delay="0"/>
+                                  </p:stCondLst>
+                                  <p:childTnLst>
+                                    <p:set>
+                                      <p:cBhvr>
+                                        <p:cTn id="27" dur="1" fill="hold">
+                                          <p:stCondLst>
+                                            <p:cond delay="0"/>
+                                          </p:stCondLst>
+                                        </p:cTn>
+                                        <p:tgtEl>
+                                          <p:spTgt spid="2">
+                                            <p:txEl>
+                                              <p:pRg st="7" end="7"/>
+                                            </p:txEl>
+                                          </p:spTgt>
+                                        </p:tgtEl>
+                                        <p:attrNameLst>
+                                          <p:attrName>style.visibility</p:attrName>
+                                        </p:attrNameLst>
+                                      </p:cBhvr>
+                                      <p:to>
+                                        <p:strVal val="visible"/>
+                                      </p:to>
+                                    </p:set>
+                                    <p:animEffect transition="in" filter="fade">
+                                      <p:cBhvr>
+                                        <p:cTn id="28" dur="500"/>
+                                        <p:tgtEl>
+                                          <p:spTgt spid="2">
+                                            <p:txEl>
+                                              <p:pRg st="7" end="7"/>
+                                            </p:txEl>
+                                          </p:spTgt>
+                                        </p:tgtEl>
+                                      </p:cBhvr>
+                                    </p:animEffect>
+                                  </p:childTnLst>
+                                </p:cTn>
+                              </p:par>
+                            </p:childTnLst>
+                          </p:cTn>
+                        </p:par>
+                      </p:childTnLst>
+                    </p:cTn>
+                  </p:par>
+                </p:childTnLst>
+              </p:cTn>
+              <p:prevCondLst>
+                <p:cond evt="onPrev" delay="0">
+                  <p:tgtEl>
+                    <p:sldTgt/>
+                  </p:tgtEl>
+                </p:cond>
+              </p:prevCondLst>
+              <p:nextCondLst>
+                <p:cond evt="onNext" delay="0">
+                  <p:tgtEl>
+                    <p:sldTgt/>
+                  </p:tgtEl>
+                </p:cond>
+              </p:nextCondLst>
+            </p:seq>
+          </p:childTnLst>
+        </p:cTn>
+      </p:par>
+    </p:tnLst>
+  </p:timing>
 </p:sld>
 </file>
 
 <file path=ppt/slides/slide4.xml><?xml version="1.0" encoding="utf-8"?>
-<p:sld xmlns:a="http://schemas.openxmlformats.org/drawingml/2006/main" xmlns:r="http://schemas.openxmlformats.org/officeDocument/2006/relationships" xmlns:p="http://schemas.openxmlformats.org/presentationml/2006/main">
-  <p:cSld>
-    <p:spTree>
-      <p:nvGrpSpPr>
-        <p:cNvPr id="1" name=""/>
-        <p:cNvGrpSpPr/>
-        <p:nvPr/>
-      </p:nvGrpSpPr>
-      <p:grpSpPr>
-        <a:xfrm>
-          <a:off x="0" y="0"/>
-          <a:ext cx="0" cy="0"/>
-          <a:chOff x="0" y="0"/>
-          <a:chExt cx="0" cy="0"/>
-        </a:xfrm>
-      </p:grpSpPr>
-      <p:sp>
-        <p:nvSpPr>
-          <p:cNvPr id="3" name="Title 2"/>
-          <p:cNvSpPr>
-            <a:spLocks noGrp="1"/>
-          </p:cNvSpPr>
-          <p:nvPr>
-            <p:ph type="title"/>
-          </p:nvPr>
-        </p:nvSpPr>
-        <p:spPr/>
-        <p:txBody>
-          <a:bodyPr/>
-          <a:lstStyle/>
-          <a:p>
-            <a:r>
-              <a:rPr lang="en-US" dirty="0"/>
-              <a:t>Tech Stack</a:t>
-            </a:r>
-          </a:p>
-        </p:txBody>
-      </p:sp>
-      <p:sp>
-        <p:nvSpPr>
-          <p:cNvPr id="2" name="Content Placeholder 1"/>
-          <p:cNvSpPr>
-            <a:spLocks noGrp="1"/>
-          </p:cNvSpPr>
-          <p:nvPr>
-            <p:ph idx="1"/>
-          </p:nvPr>
-        </p:nvSpPr>
-        <p:spPr/>
-        <p:txBody>
-          <a:bodyPr/>
-          <a:lstStyle/>
-          <a:p>
-            <a:r>
-              <a:rPr lang="en-US" dirty="0"/>
-              <a:t>Database – Oracle SQL Developer </a:t>
-            </a:r>
-          </a:p>
-          <a:p>
-            <a:r>
-              <a:rPr lang="en-US" dirty="0"/>
-              <a:t>DB Connection – Oracle Java Database Connection</a:t>
-            </a:r>
-          </a:p>
-          <a:p>
-            <a:r>
-              <a:rPr lang="en-US" dirty="0"/>
-              <a:t>Backend – Java</a:t>
-            </a:r>
-          </a:p>
-          <a:p>
-            <a:r>
-              <a:rPr lang="en-US" dirty="0"/>
-              <a:t>Frontend – JavaScript, </a:t>
-            </a:r>
-            <a:r>
-              <a:rPr lang="en-US" dirty="0" err="1"/>
-              <a:t>Jquery</a:t>
-            </a:r>
-            <a:r>
-              <a:rPr lang="en-US" dirty="0"/>
-              <a:t>, HTML, CSS, AJAX, JSON, </a:t>
-            </a:r>
-            <a:r>
-              <a:rPr lang="en-US" dirty="0" err="1"/>
-              <a:t>jackson</a:t>
-            </a:r>
-            <a:endParaRPr lang="en-US" dirty="0"/>
-          </a:p>
-          <a:p>
-            <a:pPr lvl="1"/>
-            <a:r>
-              <a:rPr lang="en-US" dirty="0"/>
-              <a:t>Bootstrap Framework</a:t>
-            </a:r>
-          </a:p>
-          <a:p>
-            <a:r>
-              <a:rPr lang="en-US" dirty="0"/>
-              <a:t>Host - Tomcat</a:t>
-            </a:r>
-          </a:p>
-        </p:txBody>
-      </p:sp>
-    </p:spTree>
-    <p:extLst>
-      <p:ext uri="{BB962C8B-B14F-4D97-AF65-F5344CB8AC3E}">
-        <p14:creationId xmlns:p14="http://schemas.microsoft.com/office/powerpoint/2010/main" val="115085417"/>
-      </p:ext>
-    </p:extLst>
-  </p:cSld>
-  <p:clrMapOvr>
-    <a:masterClrMapping/>
-  </p:clrMapOvr>
-  <mc:AlternateContent xmlns:mc="http://schemas.openxmlformats.org/markup-compatibility/2006" xmlns:p14="http://schemas.microsoft.com/office/powerpoint/2010/main">
-    <mc:Choice Requires="p14">
-      <p:transition spd="med" p14:dur="700">
-        <p:fade/>
-      </p:transition>
-    </mc:Choice>
-    <mc:Fallback xmlns="">
-      <p:transition spd="med">
-        <p:fade/>
-      </p:transition>
-    </mc:Fallback>
-  </mc:AlternateContent>
-</p:sld>
-</file>
-
-<file path=ppt/slides/slide5.xml><?xml version="1.0" encoding="utf-8"?>
 <p:sld xmlns:a="http://schemas.openxmlformats.org/drawingml/2006/main" xmlns:r="http://schemas.openxmlformats.org/officeDocument/2006/relationships" xmlns:p="http://schemas.openxmlformats.org/presentationml/2006/main">
   <p:cSld>
     <p:spTree>
@@ -5323,7 +5946,7 @@
 </p:sld>
 </file>
 
-<file path=ppt/slides/slide6.xml><?xml version="1.0" encoding="utf-8"?>
+<file path=ppt/slides/slide5.xml><?xml version="1.0" encoding="utf-8"?>
 <p:sld xmlns:a="http://schemas.openxmlformats.org/drawingml/2006/main" xmlns:r="http://schemas.openxmlformats.org/officeDocument/2006/relationships" xmlns:p="http://schemas.openxmlformats.org/presentationml/2006/main">
   <p:cSld>
     <p:spTree>
@@ -5342,7 +5965,13 @@
       </p:grpSpPr>
       <p:sp>
         <p:nvSpPr>
-          <p:cNvPr id="3" name="Title 2"/>
+          <p:cNvPr id="2" name="Title 1">
+            <a:extLst>
+              <a:ext uri="{FF2B5EF4-FFF2-40B4-BE49-F238E27FC236}">
+                <a16:creationId xmlns:a16="http://schemas.microsoft.com/office/drawing/2014/main" id="{EEFAE765-70B6-4286-A728-A72273EC1AC2}"/>
+              </a:ext>
+            </a:extLst>
+          </p:cNvPr>
           <p:cNvSpPr>
             <a:spLocks noGrp="1"/>
           </p:cNvSpPr>
@@ -5357,14 +5986,20 @@
           <a:p>
             <a:r>
               <a:rPr lang="en-US" dirty="0"/>
-              <a:t>User Stories</a:t>
-            </a:r>
-          </a:p>
-        </p:txBody>
-      </p:sp>
-      <p:sp>
-        <p:nvSpPr>
-          <p:cNvPr id="2" name="Content Placeholder 1"/>
+              <a:t>Happy Little ERS</a:t>
+            </a:r>
+          </a:p>
+        </p:txBody>
+      </p:sp>
+      <p:sp>
+        <p:nvSpPr>
+          <p:cNvPr id="3" name="Content Placeholder 2">
+            <a:extLst>
+              <a:ext uri="{FF2B5EF4-FFF2-40B4-BE49-F238E27FC236}">
+                <a16:creationId xmlns:a16="http://schemas.microsoft.com/office/drawing/2014/main" id="{2A510594-FDB9-4105-A6E0-CE4A484AFE85}"/>
+              </a:ext>
+            </a:extLst>
+          </p:cNvPr>
           <p:cNvSpPr>
             <a:spLocks noGrp="1"/>
           </p:cNvSpPr>
@@ -5377,35 +6012,14 @@
           <a:bodyPr/>
           <a:lstStyle/>
           <a:p>
-            <a:r>
-              <a:rPr lang="en-US" dirty="0"/>
-              <a:t>New employee will register then create some cases.</a:t>
-            </a:r>
-          </a:p>
-          <a:p>
-            <a:r>
-              <a:rPr lang="en-US" dirty="0"/>
-              <a:t>A manager will log in, view their own cases, then approve/deny non-owned cases</a:t>
-            </a:r>
-          </a:p>
-          <a:p>
-            <a:r>
-              <a:rPr lang="en-US" dirty="0"/>
-              <a:t>An employee will log in and see updated case statuses</a:t>
-            </a:r>
-          </a:p>
-          <a:p>
-            <a:r>
-              <a:rPr lang="en-US" dirty="0"/>
-              <a:t>Another manager will approve the first managers case</a:t>
-            </a:r>
+            <a:endParaRPr lang="en-US" dirty="0"/>
           </a:p>
         </p:txBody>
       </p:sp>
     </p:spTree>
     <p:extLst>
       <p:ext uri="{BB962C8B-B14F-4D97-AF65-F5344CB8AC3E}">
-        <p14:creationId xmlns:p14="http://schemas.microsoft.com/office/powerpoint/2010/main" val="3339554045"/>
+        <p14:creationId xmlns:p14="http://schemas.microsoft.com/office/powerpoint/2010/main" val="4125181123"/>
       </p:ext>
     </p:extLst>
   </p:cSld>
@@ -5427,7 +6041,766 @@
 </p:sld>
 </file>
 
+<file path=ppt/slides/slide6.xml><?xml version="1.0" encoding="utf-8"?>
+<p:sld xmlns:a="http://schemas.openxmlformats.org/drawingml/2006/main" xmlns:r="http://schemas.openxmlformats.org/officeDocument/2006/relationships" xmlns:p="http://schemas.openxmlformats.org/presentationml/2006/main">
+  <p:cSld>
+    <p:spTree>
+      <p:nvGrpSpPr>
+        <p:cNvPr id="1" name=""/>
+        <p:cNvGrpSpPr/>
+        <p:nvPr/>
+      </p:nvGrpSpPr>
+      <p:grpSpPr>
+        <a:xfrm>
+          <a:off x="0" y="0"/>
+          <a:ext cx="0" cy="0"/>
+          <a:chOff x="0" y="0"/>
+          <a:chExt cx="0" cy="0"/>
+        </a:xfrm>
+      </p:grpSpPr>
+      <p:sp>
+        <p:nvSpPr>
+          <p:cNvPr id="3" name="Title 2"/>
+          <p:cNvSpPr>
+            <a:spLocks noGrp="1"/>
+          </p:cNvSpPr>
+          <p:nvPr>
+            <p:ph type="title"/>
+          </p:nvPr>
+        </p:nvSpPr>
+        <p:spPr/>
+        <p:txBody>
+          <a:bodyPr/>
+          <a:lstStyle/>
+          <a:p>
+            <a:r>
+              <a:rPr lang="en-US" dirty="0"/>
+              <a:t>Tech Stack</a:t>
+            </a:r>
+          </a:p>
+        </p:txBody>
+      </p:sp>
+      <p:sp>
+        <p:nvSpPr>
+          <p:cNvPr id="2" name="Content Placeholder 1"/>
+          <p:cNvSpPr>
+            <a:spLocks noGrp="1"/>
+          </p:cNvSpPr>
+          <p:nvPr>
+            <p:ph idx="1"/>
+          </p:nvPr>
+        </p:nvSpPr>
+        <p:spPr/>
+        <p:txBody>
+          <a:bodyPr/>
+          <a:lstStyle/>
+          <a:p>
+            <a:r>
+              <a:rPr lang="en-US" dirty="0"/>
+              <a:t>Database   –   Oracle SQL Developer </a:t>
+            </a:r>
+          </a:p>
+          <a:p>
+            <a:r>
+              <a:rPr lang="en-US" dirty="0"/>
+              <a:t>DB Connection   –   Oracle Java Database Connection</a:t>
+            </a:r>
+          </a:p>
+          <a:p>
+            <a:r>
+              <a:rPr lang="en-US" dirty="0"/>
+              <a:t>Backend   –   Java,   Tomcat</a:t>
+            </a:r>
+          </a:p>
+          <a:p>
+            <a:r>
+              <a:rPr lang="en-US" dirty="0"/>
+              <a:t>Frontend   –   JavaScript,   </a:t>
+            </a:r>
+            <a:r>
+              <a:rPr lang="en-US" dirty="0" err="1"/>
+              <a:t>Jquery</a:t>
+            </a:r>
+            <a:r>
+              <a:rPr lang="en-US" dirty="0"/>
+              <a:t>,   HTML,   CSS,   AJAX,   JSON</a:t>
+            </a:r>
+          </a:p>
+          <a:p>
+            <a:pPr lvl="1"/>
+            <a:r>
+              <a:rPr lang="en-US" dirty="0"/>
+              <a:t>Bootstrap Framework</a:t>
+            </a:r>
+          </a:p>
+        </p:txBody>
+      </p:sp>
+    </p:spTree>
+    <p:extLst>
+      <p:ext uri="{BB962C8B-B14F-4D97-AF65-F5344CB8AC3E}">
+        <p14:creationId xmlns:p14="http://schemas.microsoft.com/office/powerpoint/2010/main" val="115085417"/>
+      </p:ext>
+    </p:extLst>
+  </p:cSld>
+  <p:clrMapOvr>
+    <a:masterClrMapping/>
+  </p:clrMapOvr>
+  <mc:AlternateContent xmlns:mc="http://schemas.openxmlformats.org/markup-compatibility/2006" xmlns:p14="http://schemas.microsoft.com/office/powerpoint/2010/main">
+    <mc:Choice Requires="p14">
+      <p:transition spd="med" p14:dur="700">
+        <p:fade/>
+      </p:transition>
+    </mc:Choice>
+    <mc:Fallback xmlns="">
+      <p:transition spd="med">
+        <p:fade/>
+      </p:transition>
+    </mc:Fallback>
+  </mc:AlternateContent>
+  <p:timing>
+    <p:tnLst>
+      <p:par>
+        <p:cTn id="1" dur="indefinite" restart="never" nodeType="tmRoot">
+          <p:childTnLst>
+            <p:seq concurrent="1" nextAc="seek">
+              <p:cTn id="2" dur="indefinite" nodeType="mainSeq">
+                <p:childTnLst>
+                  <p:par>
+                    <p:cTn id="3" fill="hold">
+                      <p:stCondLst>
+                        <p:cond delay="indefinite"/>
+                      </p:stCondLst>
+                      <p:childTnLst>
+                        <p:par>
+                          <p:cTn id="4" fill="hold">
+                            <p:stCondLst>
+                              <p:cond delay="0"/>
+                            </p:stCondLst>
+                            <p:childTnLst>
+                              <p:par>
+                                <p:cTn id="5" presetID="10" presetClass="entr" presetSubtype="0" fill="hold" nodeType="clickEffect">
+                                  <p:stCondLst>
+                                    <p:cond delay="0"/>
+                                  </p:stCondLst>
+                                  <p:childTnLst>
+                                    <p:set>
+                                      <p:cBhvr>
+                                        <p:cTn id="6" dur="1" fill="hold">
+                                          <p:stCondLst>
+                                            <p:cond delay="0"/>
+                                          </p:stCondLst>
+                                        </p:cTn>
+                                        <p:tgtEl>
+                                          <p:spTgt spid="2">
+                                            <p:txEl>
+                                              <p:pRg st="0" end="0"/>
+                                            </p:txEl>
+                                          </p:spTgt>
+                                        </p:tgtEl>
+                                        <p:attrNameLst>
+                                          <p:attrName>style.visibility</p:attrName>
+                                        </p:attrNameLst>
+                                      </p:cBhvr>
+                                      <p:to>
+                                        <p:strVal val="visible"/>
+                                      </p:to>
+                                    </p:set>
+                                    <p:animEffect transition="in" filter="fade">
+                                      <p:cBhvr>
+                                        <p:cTn id="7" dur="500"/>
+                                        <p:tgtEl>
+                                          <p:spTgt spid="2">
+                                            <p:txEl>
+                                              <p:pRg st="0" end="0"/>
+                                            </p:txEl>
+                                          </p:spTgt>
+                                        </p:tgtEl>
+                                      </p:cBhvr>
+                                    </p:animEffect>
+                                  </p:childTnLst>
+                                </p:cTn>
+                              </p:par>
+                            </p:childTnLst>
+                          </p:cTn>
+                        </p:par>
+                      </p:childTnLst>
+                    </p:cTn>
+                  </p:par>
+                  <p:par>
+                    <p:cTn id="8" fill="hold">
+                      <p:stCondLst>
+                        <p:cond delay="indefinite"/>
+                      </p:stCondLst>
+                      <p:childTnLst>
+                        <p:par>
+                          <p:cTn id="9" fill="hold">
+                            <p:stCondLst>
+                              <p:cond delay="0"/>
+                            </p:stCondLst>
+                            <p:childTnLst>
+                              <p:par>
+                                <p:cTn id="10" presetID="10" presetClass="entr" presetSubtype="0" fill="hold" nodeType="clickEffect">
+                                  <p:stCondLst>
+                                    <p:cond delay="0"/>
+                                  </p:stCondLst>
+                                  <p:childTnLst>
+                                    <p:set>
+                                      <p:cBhvr>
+                                        <p:cTn id="11" dur="1" fill="hold">
+                                          <p:stCondLst>
+                                            <p:cond delay="0"/>
+                                          </p:stCondLst>
+                                        </p:cTn>
+                                        <p:tgtEl>
+                                          <p:spTgt spid="2">
+                                            <p:txEl>
+                                              <p:pRg st="1" end="1"/>
+                                            </p:txEl>
+                                          </p:spTgt>
+                                        </p:tgtEl>
+                                        <p:attrNameLst>
+                                          <p:attrName>style.visibility</p:attrName>
+                                        </p:attrNameLst>
+                                      </p:cBhvr>
+                                      <p:to>
+                                        <p:strVal val="visible"/>
+                                      </p:to>
+                                    </p:set>
+                                    <p:animEffect transition="in" filter="fade">
+                                      <p:cBhvr>
+                                        <p:cTn id="12" dur="500"/>
+                                        <p:tgtEl>
+                                          <p:spTgt spid="2">
+                                            <p:txEl>
+                                              <p:pRg st="1" end="1"/>
+                                            </p:txEl>
+                                          </p:spTgt>
+                                        </p:tgtEl>
+                                      </p:cBhvr>
+                                    </p:animEffect>
+                                  </p:childTnLst>
+                                </p:cTn>
+                              </p:par>
+                            </p:childTnLst>
+                          </p:cTn>
+                        </p:par>
+                      </p:childTnLst>
+                    </p:cTn>
+                  </p:par>
+                  <p:par>
+                    <p:cTn id="13" fill="hold">
+                      <p:stCondLst>
+                        <p:cond delay="indefinite"/>
+                      </p:stCondLst>
+                      <p:childTnLst>
+                        <p:par>
+                          <p:cTn id="14" fill="hold">
+                            <p:stCondLst>
+                              <p:cond delay="0"/>
+                            </p:stCondLst>
+                            <p:childTnLst>
+                              <p:par>
+                                <p:cTn id="15" presetID="10" presetClass="entr" presetSubtype="0" fill="hold" nodeType="clickEffect">
+                                  <p:stCondLst>
+                                    <p:cond delay="0"/>
+                                  </p:stCondLst>
+                                  <p:childTnLst>
+                                    <p:set>
+                                      <p:cBhvr>
+                                        <p:cTn id="16" dur="1" fill="hold">
+                                          <p:stCondLst>
+                                            <p:cond delay="0"/>
+                                          </p:stCondLst>
+                                        </p:cTn>
+                                        <p:tgtEl>
+                                          <p:spTgt spid="2">
+                                            <p:txEl>
+                                              <p:pRg st="2" end="2"/>
+                                            </p:txEl>
+                                          </p:spTgt>
+                                        </p:tgtEl>
+                                        <p:attrNameLst>
+                                          <p:attrName>style.visibility</p:attrName>
+                                        </p:attrNameLst>
+                                      </p:cBhvr>
+                                      <p:to>
+                                        <p:strVal val="visible"/>
+                                      </p:to>
+                                    </p:set>
+                                    <p:animEffect transition="in" filter="fade">
+                                      <p:cBhvr>
+                                        <p:cTn id="17" dur="500"/>
+                                        <p:tgtEl>
+                                          <p:spTgt spid="2">
+                                            <p:txEl>
+                                              <p:pRg st="2" end="2"/>
+                                            </p:txEl>
+                                          </p:spTgt>
+                                        </p:tgtEl>
+                                      </p:cBhvr>
+                                    </p:animEffect>
+                                  </p:childTnLst>
+                                </p:cTn>
+                              </p:par>
+                            </p:childTnLst>
+                          </p:cTn>
+                        </p:par>
+                      </p:childTnLst>
+                    </p:cTn>
+                  </p:par>
+                  <p:par>
+                    <p:cTn id="18" fill="hold">
+                      <p:stCondLst>
+                        <p:cond delay="indefinite"/>
+                      </p:stCondLst>
+                      <p:childTnLst>
+                        <p:par>
+                          <p:cTn id="19" fill="hold">
+                            <p:stCondLst>
+                              <p:cond delay="0"/>
+                            </p:stCondLst>
+                            <p:childTnLst>
+                              <p:par>
+                                <p:cTn id="20" presetID="10" presetClass="entr" presetSubtype="0" fill="hold" nodeType="clickEffect">
+                                  <p:stCondLst>
+                                    <p:cond delay="0"/>
+                                  </p:stCondLst>
+                                  <p:childTnLst>
+                                    <p:set>
+                                      <p:cBhvr>
+                                        <p:cTn id="21" dur="1" fill="hold">
+                                          <p:stCondLst>
+                                            <p:cond delay="0"/>
+                                          </p:stCondLst>
+                                        </p:cTn>
+                                        <p:tgtEl>
+                                          <p:spTgt spid="2">
+                                            <p:txEl>
+                                              <p:pRg st="3" end="3"/>
+                                            </p:txEl>
+                                          </p:spTgt>
+                                        </p:tgtEl>
+                                        <p:attrNameLst>
+                                          <p:attrName>style.visibility</p:attrName>
+                                        </p:attrNameLst>
+                                      </p:cBhvr>
+                                      <p:to>
+                                        <p:strVal val="visible"/>
+                                      </p:to>
+                                    </p:set>
+                                    <p:animEffect transition="in" filter="fade">
+                                      <p:cBhvr>
+                                        <p:cTn id="22" dur="500"/>
+                                        <p:tgtEl>
+                                          <p:spTgt spid="2">
+                                            <p:txEl>
+                                              <p:pRg st="3" end="3"/>
+                                            </p:txEl>
+                                          </p:spTgt>
+                                        </p:tgtEl>
+                                      </p:cBhvr>
+                                    </p:animEffect>
+                                  </p:childTnLst>
+                                </p:cTn>
+                              </p:par>
+                              <p:par>
+                                <p:cTn id="23" presetID="10" presetClass="entr" presetSubtype="0" fill="hold" nodeType="withEffect">
+                                  <p:stCondLst>
+                                    <p:cond delay="0"/>
+                                  </p:stCondLst>
+                                  <p:childTnLst>
+                                    <p:set>
+                                      <p:cBhvr>
+                                        <p:cTn id="24" dur="1" fill="hold">
+                                          <p:stCondLst>
+                                            <p:cond delay="0"/>
+                                          </p:stCondLst>
+                                        </p:cTn>
+                                        <p:tgtEl>
+                                          <p:spTgt spid="2">
+                                            <p:txEl>
+                                              <p:pRg st="4" end="4"/>
+                                            </p:txEl>
+                                          </p:spTgt>
+                                        </p:tgtEl>
+                                        <p:attrNameLst>
+                                          <p:attrName>style.visibility</p:attrName>
+                                        </p:attrNameLst>
+                                      </p:cBhvr>
+                                      <p:to>
+                                        <p:strVal val="visible"/>
+                                      </p:to>
+                                    </p:set>
+                                    <p:animEffect transition="in" filter="fade">
+                                      <p:cBhvr>
+                                        <p:cTn id="25" dur="500"/>
+                                        <p:tgtEl>
+                                          <p:spTgt spid="2">
+                                            <p:txEl>
+                                              <p:pRg st="4" end="4"/>
+                                            </p:txEl>
+                                          </p:spTgt>
+                                        </p:tgtEl>
+                                      </p:cBhvr>
+                                    </p:animEffect>
+                                  </p:childTnLst>
+                                </p:cTn>
+                              </p:par>
+                            </p:childTnLst>
+                          </p:cTn>
+                        </p:par>
+                      </p:childTnLst>
+                    </p:cTn>
+                  </p:par>
+                </p:childTnLst>
+              </p:cTn>
+              <p:prevCondLst>
+                <p:cond evt="onPrev" delay="0">
+                  <p:tgtEl>
+                    <p:sldTgt/>
+                  </p:tgtEl>
+                </p:cond>
+              </p:prevCondLst>
+              <p:nextCondLst>
+                <p:cond evt="onNext" delay="0">
+                  <p:tgtEl>
+                    <p:sldTgt/>
+                  </p:tgtEl>
+                </p:cond>
+              </p:nextCondLst>
+            </p:seq>
+          </p:childTnLst>
+        </p:cTn>
+      </p:par>
+    </p:tnLst>
+  </p:timing>
+</p:sld>
+</file>
+
 <file path=ppt/slides/slide7.xml><?xml version="1.0" encoding="utf-8"?>
+<p:sld xmlns:a="http://schemas.openxmlformats.org/drawingml/2006/main" xmlns:r="http://schemas.openxmlformats.org/officeDocument/2006/relationships" xmlns:p="http://schemas.openxmlformats.org/presentationml/2006/main">
+  <p:cSld>
+    <p:spTree>
+      <p:nvGrpSpPr>
+        <p:cNvPr id="1" name=""/>
+        <p:cNvGrpSpPr/>
+        <p:nvPr/>
+      </p:nvGrpSpPr>
+      <p:grpSpPr>
+        <a:xfrm>
+          <a:off x="0" y="0"/>
+          <a:ext cx="0" cy="0"/>
+          <a:chOff x="0" y="0"/>
+          <a:chExt cx="0" cy="0"/>
+        </a:xfrm>
+      </p:grpSpPr>
+      <p:sp>
+        <p:nvSpPr>
+          <p:cNvPr id="2" name="Title 1">
+            <a:extLst>
+              <a:ext uri="{FF2B5EF4-FFF2-40B4-BE49-F238E27FC236}">
+                <a16:creationId xmlns:a16="http://schemas.microsoft.com/office/drawing/2014/main" id="{0F8C45B0-969E-41DA-A722-AE14D512779F}"/>
+              </a:ext>
+            </a:extLst>
+          </p:cNvPr>
+          <p:cNvSpPr>
+            <a:spLocks noGrp="1"/>
+          </p:cNvSpPr>
+          <p:nvPr>
+            <p:ph type="title"/>
+          </p:nvPr>
+        </p:nvSpPr>
+        <p:spPr/>
+        <p:txBody>
+          <a:bodyPr/>
+          <a:lstStyle/>
+          <a:p>
+            <a:r>
+              <a:rPr lang="en-US" dirty="0"/>
+              <a:t>Future Features</a:t>
+            </a:r>
+          </a:p>
+        </p:txBody>
+      </p:sp>
+      <p:sp>
+        <p:nvSpPr>
+          <p:cNvPr id="3" name="Content Placeholder 2">
+            <a:extLst>
+              <a:ext uri="{FF2B5EF4-FFF2-40B4-BE49-F238E27FC236}">
+                <a16:creationId xmlns:a16="http://schemas.microsoft.com/office/drawing/2014/main" id="{804C32E1-0AFB-4E35-86C4-1A22A218F722}"/>
+              </a:ext>
+            </a:extLst>
+          </p:cNvPr>
+          <p:cNvSpPr>
+            <a:spLocks noGrp="1"/>
+          </p:cNvSpPr>
+          <p:nvPr>
+            <p:ph idx="1"/>
+          </p:nvPr>
+        </p:nvSpPr>
+        <p:spPr/>
+        <p:txBody>
+          <a:bodyPr/>
+          <a:lstStyle/>
+          <a:p>
+            <a:r>
+              <a:rPr lang="en-US" dirty="0"/>
+              <a:t>Allow feedback from management</a:t>
+            </a:r>
+          </a:p>
+          <a:p>
+            <a:r>
+              <a:rPr lang="en-US" dirty="0"/>
+              <a:t>Allow users to cancel cases</a:t>
+            </a:r>
+          </a:p>
+          <a:p>
+            <a:r>
+              <a:rPr lang="en-US" dirty="0"/>
+              <a:t>Let ‘enter’ activate submit buttons</a:t>
+            </a:r>
+          </a:p>
+        </p:txBody>
+      </p:sp>
+    </p:spTree>
+    <p:extLst>
+      <p:ext uri="{BB962C8B-B14F-4D97-AF65-F5344CB8AC3E}">
+        <p14:creationId xmlns:p14="http://schemas.microsoft.com/office/powerpoint/2010/main" val="92876662"/>
+      </p:ext>
+    </p:extLst>
+  </p:cSld>
+  <p:clrMapOvr>
+    <a:masterClrMapping/>
+  </p:clrMapOvr>
+  <mc:AlternateContent xmlns:mc="http://schemas.openxmlformats.org/markup-compatibility/2006" xmlns:p14="http://schemas.microsoft.com/office/powerpoint/2010/main">
+    <mc:Choice Requires="p14">
+      <p:transition spd="med" p14:dur="700">
+        <p:fade/>
+      </p:transition>
+    </mc:Choice>
+    <mc:Fallback xmlns="">
+      <p:transition spd="med">
+        <p:fade/>
+      </p:transition>
+    </mc:Fallback>
+  </mc:AlternateContent>
+  <p:timing>
+    <p:tnLst>
+      <p:par>
+        <p:cTn id="1" dur="indefinite" restart="never" nodeType="tmRoot">
+          <p:childTnLst>
+            <p:seq concurrent="1" nextAc="seek">
+              <p:cTn id="2" dur="indefinite" nodeType="mainSeq">
+                <p:childTnLst>
+                  <p:par>
+                    <p:cTn id="3" fill="hold">
+                      <p:stCondLst>
+                        <p:cond delay="indefinite"/>
+                      </p:stCondLst>
+                      <p:childTnLst>
+                        <p:par>
+                          <p:cTn id="4" fill="hold">
+                            <p:stCondLst>
+                              <p:cond delay="0"/>
+                            </p:stCondLst>
+                            <p:childTnLst>
+                              <p:par>
+                                <p:cTn id="5" presetID="10" presetClass="entr" presetSubtype="0" fill="hold" nodeType="clickEffect">
+                                  <p:stCondLst>
+                                    <p:cond delay="0"/>
+                                  </p:stCondLst>
+                                  <p:childTnLst>
+                                    <p:set>
+                                      <p:cBhvr>
+                                        <p:cTn id="6" dur="1" fill="hold">
+                                          <p:stCondLst>
+                                            <p:cond delay="0"/>
+                                          </p:stCondLst>
+                                        </p:cTn>
+                                        <p:tgtEl>
+                                          <p:spTgt spid="3">
+                                            <p:txEl>
+                                              <p:pRg st="0" end="0"/>
+                                            </p:txEl>
+                                          </p:spTgt>
+                                        </p:tgtEl>
+                                        <p:attrNameLst>
+                                          <p:attrName>style.visibility</p:attrName>
+                                        </p:attrNameLst>
+                                      </p:cBhvr>
+                                      <p:to>
+                                        <p:strVal val="visible"/>
+                                      </p:to>
+                                    </p:set>
+                                    <p:animEffect transition="in" filter="fade">
+                                      <p:cBhvr>
+                                        <p:cTn id="7" dur="500"/>
+                                        <p:tgtEl>
+                                          <p:spTgt spid="3">
+                                            <p:txEl>
+                                              <p:pRg st="0" end="0"/>
+                                            </p:txEl>
+                                          </p:spTgt>
+                                        </p:tgtEl>
+                                      </p:cBhvr>
+                                    </p:animEffect>
+                                  </p:childTnLst>
+                                </p:cTn>
+                              </p:par>
+                            </p:childTnLst>
+                          </p:cTn>
+                        </p:par>
+                      </p:childTnLst>
+                    </p:cTn>
+                  </p:par>
+                  <p:par>
+                    <p:cTn id="8" fill="hold">
+                      <p:stCondLst>
+                        <p:cond delay="indefinite"/>
+                      </p:stCondLst>
+                      <p:childTnLst>
+                        <p:par>
+                          <p:cTn id="9" fill="hold">
+                            <p:stCondLst>
+                              <p:cond delay="0"/>
+                            </p:stCondLst>
+                            <p:childTnLst>
+                              <p:par>
+                                <p:cTn id="10" presetID="10" presetClass="entr" presetSubtype="0" fill="hold" nodeType="clickEffect">
+                                  <p:stCondLst>
+                                    <p:cond delay="0"/>
+                                  </p:stCondLst>
+                                  <p:childTnLst>
+                                    <p:set>
+                                      <p:cBhvr>
+                                        <p:cTn id="11" dur="1" fill="hold">
+                                          <p:stCondLst>
+                                            <p:cond delay="0"/>
+                                          </p:stCondLst>
+                                        </p:cTn>
+                                        <p:tgtEl>
+                                          <p:spTgt spid="3">
+                                            <p:txEl>
+                                              <p:pRg st="1" end="1"/>
+                                            </p:txEl>
+                                          </p:spTgt>
+                                        </p:tgtEl>
+                                        <p:attrNameLst>
+                                          <p:attrName>style.visibility</p:attrName>
+                                        </p:attrNameLst>
+                                      </p:cBhvr>
+                                      <p:to>
+                                        <p:strVal val="visible"/>
+                                      </p:to>
+                                    </p:set>
+                                    <p:animEffect transition="in" filter="fade">
+                                      <p:cBhvr>
+                                        <p:cTn id="12" dur="500"/>
+                                        <p:tgtEl>
+                                          <p:spTgt spid="3">
+                                            <p:txEl>
+                                              <p:pRg st="1" end="1"/>
+                                            </p:txEl>
+                                          </p:spTgt>
+                                        </p:tgtEl>
+                                      </p:cBhvr>
+                                    </p:animEffect>
+                                  </p:childTnLst>
+                                </p:cTn>
+                              </p:par>
+                            </p:childTnLst>
+                          </p:cTn>
+                        </p:par>
+                      </p:childTnLst>
+                    </p:cTn>
+                  </p:par>
+                  <p:par>
+                    <p:cTn id="13" fill="hold">
+                      <p:stCondLst>
+                        <p:cond delay="indefinite"/>
+                      </p:stCondLst>
+                      <p:childTnLst>
+                        <p:par>
+                          <p:cTn id="14" fill="hold">
+                            <p:stCondLst>
+                              <p:cond delay="0"/>
+                            </p:stCondLst>
+                            <p:childTnLst>
+                              <p:par>
+                                <p:cTn id="15" presetID="10" presetClass="entr" presetSubtype="0" fill="hold" nodeType="clickEffect">
+                                  <p:stCondLst>
+                                    <p:cond delay="0"/>
+                                  </p:stCondLst>
+                                  <p:childTnLst>
+                                    <p:set>
+                                      <p:cBhvr>
+                                        <p:cTn id="16" dur="1" fill="hold">
+                                          <p:stCondLst>
+                                            <p:cond delay="0"/>
+                                          </p:stCondLst>
+                                        </p:cTn>
+                                        <p:tgtEl>
+                                          <p:spTgt spid="3">
+                                            <p:txEl>
+                                              <p:pRg st="2" end="2"/>
+                                            </p:txEl>
+                                          </p:spTgt>
+                                        </p:tgtEl>
+                                        <p:attrNameLst>
+                                          <p:attrName>style.visibility</p:attrName>
+                                        </p:attrNameLst>
+                                      </p:cBhvr>
+                                      <p:to>
+                                        <p:strVal val="visible"/>
+                                      </p:to>
+                                    </p:set>
+                                    <p:animEffect transition="in" filter="fade">
+                                      <p:cBhvr>
+                                        <p:cTn id="17" dur="500"/>
+                                        <p:tgtEl>
+                                          <p:spTgt spid="3">
+                                            <p:txEl>
+                                              <p:pRg st="2" end="2"/>
+                                            </p:txEl>
+                                          </p:spTgt>
+                                        </p:tgtEl>
+                                      </p:cBhvr>
+                                    </p:animEffect>
+                                  </p:childTnLst>
+                                </p:cTn>
+                              </p:par>
+                            </p:childTnLst>
+                          </p:cTn>
+                        </p:par>
+                      </p:childTnLst>
+                    </p:cTn>
+                  </p:par>
+                </p:childTnLst>
+              </p:cTn>
+              <p:prevCondLst>
+                <p:cond evt="onPrev" delay="0">
+                  <p:tgtEl>
+                    <p:sldTgt/>
+                  </p:tgtEl>
+                </p:cond>
+              </p:prevCondLst>
+              <p:nextCondLst>
+                <p:cond evt="onNext" delay="0">
+                  <p:tgtEl>
+                    <p:sldTgt/>
+                  </p:tgtEl>
+                </p:cond>
+              </p:nextCondLst>
+            </p:seq>
+          </p:childTnLst>
+        </p:cTn>
+      </p:par>
+    </p:tnLst>
+  </p:timing>
+</p:sld>
+</file>
+
+<file path=ppt/slides/slide8.xml><?xml version="1.0" encoding="utf-8"?>
 <p:sld xmlns:a="http://schemas.openxmlformats.org/drawingml/2006/main" xmlns:r="http://schemas.openxmlformats.org/officeDocument/2006/relationships" xmlns:p="http://schemas.openxmlformats.org/presentationml/2006/main">
   <p:cSld>
     <p:spTree>

</xml_diff>